<commit_message>
update and add ppt
</commit_message>
<xml_diff>
--- a/第4讲 被动回复消息.pptx
+++ b/第4讲 被动回复消息.pptx
@@ -266,7 +266,7 @@
           <a:p>
             <a:fld id="{2B71C804-97F5-4B36-A7AC-EEEC7F44F6C2}" type="datetimeFigureOut">
               <a:rPr lang="zh-CN" altLang="en-US" smtClean="0"/>
-              <a:t>2017/7/10</a:t>
+              <a:t>2017/8/17</a:t>
             </a:fld>
             <a:endParaRPr lang="zh-CN" altLang="en-US"/>
           </a:p>
@@ -432,7 +432,7 @@
           <a:p>
             <a:fld id="{0568D9C6-D8DC-4CC3-8480-E0C4DBA1CC07}" type="datetimeFigureOut">
               <a:rPr lang="zh-CN" altLang="en-US" smtClean="0"/>
-              <a:t>2017/7/10</a:t>
+              <a:t>2017/8/17</a:t>
             </a:fld>
             <a:endParaRPr lang="zh-CN" altLang="en-US"/>
           </a:p>
@@ -1045,7 +1045,7 @@
           <a:p>
             <a:fld id="{DB9D664F-4C68-42D2-B189-678958EFAFDA}" type="datetime1">
               <a:rPr lang="zh-CN" altLang="en-US" smtClean="0"/>
-              <a:t>2017/7/10</a:t>
+              <a:t>2017/8/17</a:t>
             </a:fld>
             <a:endParaRPr lang="zh-CN" altLang="en-US"/>
           </a:p>
@@ -2027,7 +2027,7 @@
           <a:p>
             <a:fld id="{ED5513C8-E3A4-4D78-B249-887659A958FF}" type="datetime1">
               <a:rPr lang="en-US" altLang="zh-CN" smtClean="0"/>
-              <a:t>7/10/2017</a:t>
+              <a:t>8/17/2017</a:t>
             </a:fld>
             <a:endParaRPr lang="en-US"/>
           </a:p>
@@ -2205,7 +2205,7 @@
           <a:p>
             <a:fld id="{EBEDA52C-3EEE-4289-818C-901C0A7814FE}" type="datetime1">
               <a:rPr lang="en-US" altLang="zh-CN" smtClean="0"/>
-              <a:t>7/10/2017</a:t>
+              <a:t>8/17/2017</a:t>
             </a:fld>
             <a:endParaRPr lang="en-US"/>
           </a:p>
@@ -2459,7 +2459,7 @@
           <a:p>
             <a:fld id="{09EF5D7F-EA15-485C-85DD-8FDC010A62D4}" type="datetime1">
               <a:rPr lang="en-US" altLang="zh-CN" smtClean="0"/>
-              <a:t>7/10/2017</a:t>
+              <a:t>8/17/2017</a:t>
             </a:fld>
             <a:endParaRPr lang="en-US"/>
           </a:p>
@@ -2699,7 +2699,7 @@
           <a:p>
             <a:fld id="{9541C2B2-0BAB-4CD4-83EE-25F1A7138896}" type="datetime1">
               <a:rPr lang="en-US" altLang="zh-CN" smtClean="0"/>
-              <a:t>7/10/2017</a:t>
+              <a:t>8/17/2017</a:t>
             </a:fld>
             <a:endParaRPr lang="en-US"/>
           </a:p>
@@ -3074,7 +3074,7 @@
           <a:p>
             <a:fld id="{7DEA23E7-D0FC-41DC-8745-BE6FC447B182}" type="datetime1">
               <a:rPr lang="en-US" altLang="zh-CN" smtClean="0"/>
-              <a:t>7/10/2017</a:t>
+              <a:t>8/17/2017</a:t>
             </a:fld>
             <a:endParaRPr lang="en-US"/>
           </a:p>
@@ -3859,7 +3859,7 @@
           <a:p>
             <a:fld id="{5DEA8378-5F33-490B-8120-8DE6B7EE2781}" type="datetime1">
               <a:rPr lang="en-US" altLang="zh-CN" smtClean="0"/>
-              <a:t>7/10/2017</a:t>
+              <a:t>8/17/2017</a:t>
             </a:fld>
             <a:endParaRPr lang="en-US"/>
           </a:p>
@@ -4113,7 +4113,7 @@
           <a:p>
             <a:fld id="{38DD30CF-78A7-4C73-91B4-38D3E3317745}" type="datetime1">
               <a:rPr lang="en-US" altLang="zh-CN" smtClean="0"/>
-              <a:t>7/10/2017</a:t>
+              <a:t>8/17/2017</a:t>
             </a:fld>
             <a:endParaRPr lang="en-US"/>
           </a:p>
@@ -4216,7 +4216,7 @@
           <a:p>
             <a:fld id="{A1BE0A72-8501-4974-A7B7-5BD248ABBAFC}" type="datetime1">
               <a:rPr lang="zh-CN" altLang="en-US" smtClean="0"/>
-              <a:t>2017/7/10</a:t>
+              <a:t>2017/8/17</a:t>
             </a:fld>
             <a:endParaRPr lang="zh-CN" altLang="en-US"/>
           </a:p>
@@ -4477,7 +4477,7 @@
           <a:p>
             <a:fld id="{0B7E01DD-16D0-4DBA-9C1A-51468BA0B73A}" type="datetime1">
               <a:rPr lang="en-US" altLang="zh-CN" smtClean="0"/>
-              <a:t>7/10/2017</a:t>
+              <a:t>8/17/2017</a:t>
             </a:fld>
             <a:endParaRPr lang="en-US"/>
           </a:p>
@@ -4655,7 +4655,7 @@
           <a:p>
             <a:fld id="{B587E63F-0E62-4A50-901F-E071D77F7634}" type="datetime1">
               <a:rPr lang="en-US" altLang="zh-CN" smtClean="0"/>
-              <a:t>7/10/2017</a:t>
+              <a:t>8/17/2017</a:t>
             </a:fld>
             <a:endParaRPr lang="en-US"/>
           </a:p>
@@ -4843,7 +4843,7 @@
           <a:p>
             <a:fld id="{BD8521E8-9297-400B-AD8C-0A4D05699D33}" type="datetime1">
               <a:rPr lang="en-US" altLang="zh-CN" smtClean="0"/>
-              <a:t>7/10/2017</a:t>
+              <a:t>8/17/2017</a:t>
             </a:fld>
             <a:endParaRPr lang="en-US"/>
           </a:p>
@@ -5074,7 +5074,7 @@
           <a:p>
             <a:fld id="{ED5513C8-E3A4-4D78-B249-887659A958FF}" type="datetime1">
               <a:rPr lang="en-US" altLang="zh-CN" smtClean="0"/>
-              <a:t>7/10/2017</a:t>
+              <a:t>8/17/2017</a:t>
             </a:fld>
             <a:endParaRPr lang="en-US"/>
           </a:p>
@@ -5252,7 +5252,7 @@
           <a:p>
             <a:fld id="{EBEDA52C-3EEE-4289-818C-901C0A7814FE}" type="datetime1">
               <a:rPr lang="en-US" altLang="zh-CN" smtClean="0"/>
-              <a:t>7/10/2017</a:t>
+              <a:t>8/17/2017</a:t>
             </a:fld>
             <a:endParaRPr lang="en-US"/>
           </a:p>
@@ -5506,7 +5506,7 @@
           <a:p>
             <a:fld id="{09EF5D7F-EA15-485C-85DD-8FDC010A62D4}" type="datetime1">
               <a:rPr lang="en-US" altLang="zh-CN" smtClean="0"/>
-              <a:t>7/10/2017</a:t>
+              <a:t>8/17/2017</a:t>
             </a:fld>
             <a:endParaRPr lang="en-US"/>
           </a:p>
@@ -5746,7 +5746,7 @@
           <a:p>
             <a:fld id="{9541C2B2-0BAB-4CD4-83EE-25F1A7138896}" type="datetime1">
               <a:rPr lang="en-US" altLang="zh-CN" smtClean="0"/>
-              <a:t>7/10/2017</a:t>
+              <a:t>8/17/2017</a:t>
             </a:fld>
             <a:endParaRPr lang="en-US"/>
           </a:p>
@@ -6121,7 +6121,7 @@
           <a:p>
             <a:fld id="{7DEA23E7-D0FC-41DC-8745-BE6FC447B182}" type="datetime1">
               <a:rPr lang="en-US" altLang="zh-CN" smtClean="0"/>
-              <a:t>7/10/2017</a:t>
+              <a:t>8/17/2017</a:t>
             </a:fld>
             <a:endParaRPr lang="en-US"/>
           </a:p>
@@ -6906,7 +6906,7 @@
           <a:p>
             <a:fld id="{A1BE0A72-8501-4974-A7B7-5BD248ABBAFC}" type="datetime1">
               <a:rPr lang="zh-CN" altLang="en-US" smtClean="0"/>
-              <a:t>2017/7/10</a:t>
+              <a:t>2017/8/17</a:t>
             </a:fld>
             <a:endParaRPr lang="zh-CN" altLang="en-US"/>
           </a:p>
@@ -6959,7 +6959,7 @@
           <a:p>
             <a:fld id="{5DEA8378-5F33-490B-8120-8DE6B7EE2781}" type="datetime1">
               <a:rPr lang="en-US" altLang="zh-CN" smtClean="0"/>
-              <a:t>7/10/2017</a:t>
+              <a:t>8/17/2017</a:t>
             </a:fld>
             <a:endParaRPr lang="en-US"/>
           </a:p>
@@ -7213,7 +7213,7 @@
           <a:p>
             <a:fld id="{38DD30CF-78A7-4C73-91B4-38D3E3317745}" type="datetime1">
               <a:rPr lang="en-US" altLang="zh-CN" smtClean="0"/>
-              <a:t>7/10/2017</a:t>
+              <a:t>8/17/2017</a:t>
             </a:fld>
             <a:endParaRPr lang="en-US"/>
           </a:p>
@@ -7478,7 +7478,7 @@
           <a:p>
             <a:fld id="{0B7E01DD-16D0-4DBA-9C1A-51468BA0B73A}" type="datetime1">
               <a:rPr lang="en-US" altLang="zh-CN" smtClean="0"/>
-              <a:t>7/10/2017</a:t>
+              <a:t>8/17/2017</a:t>
             </a:fld>
             <a:endParaRPr lang="en-US"/>
           </a:p>
@@ -7656,7 +7656,7 @@
           <a:p>
             <a:fld id="{B587E63F-0E62-4A50-901F-E071D77F7634}" type="datetime1">
               <a:rPr lang="en-US" altLang="zh-CN" smtClean="0"/>
-              <a:t>7/10/2017</a:t>
+              <a:t>8/17/2017</a:t>
             </a:fld>
             <a:endParaRPr lang="en-US"/>
           </a:p>
@@ -7844,7 +7844,7 @@
           <a:p>
             <a:fld id="{BD8521E8-9297-400B-AD8C-0A4D05699D33}" type="datetime1">
               <a:rPr lang="en-US" altLang="zh-CN" smtClean="0"/>
-              <a:t>7/10/2017</a:t>
+              <a:t>8/17/2017</a:t>
             </a:fld>
             <a:endParaRPr lang="en-US"/>
           </a:p>
@@ -7947,7 +7947,7 @@
           <a:p>
             <a:fld id="{EF452D9C-F9EB-4417-9C3A-C876C2AF9415}" type="datetime1">
               <a:rPr lang="zh-CN" altLang="en-US" smtClean="0"/>
-              <a:t>2017/7/10</a:t>
+              <a:t>2017/8/17</a:t>
             </a:fld>
             <a:endParaRPr lang="zh-CN" altLang="en-US"/>
           </a:p>
@@ -8133,7 +8133,7 @@
           <a:p>
             <a:fld id="{2F2E9289-9B4C-49AE-BDDA-70D6EDC89D17}" type="datetime1">
               <a:rPr lang="zh-CN" altLang="en-US" smtClean="0"/>
-              <a:t>2017/7/10</a:t>
+              <a:t>2017/8/17</a:t>
             </a:fld>
             <a:endParaRPr lang="zh-CN" altLang="en-US"/>
           </a:p>
@@ -8303,7 +8303,7 @@
           <a:p>
             <a:fld id="{2F2E9289-9B4C-49AE-BDDA-70D6EDC89D17}" type="datetime1">
               <a:rPr lang="zh-CN" altLang="en-US" smtClean="0"/>
-              <a:t>2017/7/10</a:t>
+              <a:t>2017/8/17</a:t>
             </a:fld>
             <a:endParaRPr lang="zh-CN" altLang="en-US"/>
           </a:p>
@@ -8539,7 +8539,7 @@
           <a:p>
             <a:fld id="{8C5BA751-A251-47D6-8494-C134D9EBED5F}" type="datetime1">
               <a:rPr lang="zh-CN" altLang="en-US" smtClean="0"/>
-              <a:t>2017/7/10</a:t>
+              <a:t>2017/8/17</a:t>
             </a:fld>
             <a:endParaRPr lang="zh-CN" altLang="en-US"/>
           </a:p>
@@ -8895,7 +8895,7 @@
           <a:p>
             <a:fld id="{C46E2078-F302-4651-A2A2-2FC6C4E1A3F1}" type="datetime1">
               <a:rPr lang="zh-CN" altLang="en-US" smtClean="0"/>
-              <a:t>2017/7/10</a:t>
+              <a:t>2017/8/17</a:t>
             </a:fld>
             <a:endParaRPr lang="zh-CN" altLang="en-US"/>
           </a:p>
@@ -9017,7 +9017,7 @@
               <a:pPr>
                 <a:defRPr/>
               </a:pPr>
-              <a:t>2017/7/10</a:t>
+              <a:t>2017/8/17</a:t>
             </a:fld>
             <a:endParaRPr lang="zh-CN" altLang="en-US"/>
           </a:p>
@@ -9165,7 +9165,7 @@
           <a:p>
             <a:fld id="{A1BE0A72-8501-4974-A7B7-5BD248ABBAFC}" type="datetime1">
               <a:rPr lang="zh-CN" altLang="en-US" smtClean="0"/>
-              <a:t>2017/7/10</a:t>
+              <a:t>2017/8/17</a:t>
             </a:fld>
             <a:endParaRPr lang="zh-CN" altLang="en-US"/>
           </a:p>
@@ -9679,7 +9679,7 @@
           <a:p>
             <a:fld id="{A1BE0A72-8501-4974-A7B7-5BD248ABBAFC}" type="datetime1">
               <a:rPr lang="zh-CN" altLang="en-US" smtClean="0"/>
-              <a:t>2017/7/10</a:t>
+              <a:t>2017/8/17</a:t>
             </a:fld>
             <a:endParaRPr lang="zh-CN" altLang="en-US"/>
           </a:p>
@@ -10285,7 +10285,7 @@
           <a:p>
             <a:fld id="{7A78726F-0AD2-4A20-BC72-263D2D3F3A2F}" type="datetime1">
               <a:rPr lang="en-US" altLang="zh-CN" smtClean="0"/>
-              <a:t>7/10/2017</a:t>
+              <a:t>8/17/2017</a:t>
             </a:fld>
             <a:endParaRPr lang="en-US"/>
           </a:p>
@@ -11266,7 +11266,7 @@
           <a:p>
             <a:fld id="{A1BE0A72-8501-4974-A7B7-5BD248ABBAFC}" type="datetime1">
               <a:rPr lang="zh-CN" altLang="en-US" smtClean="0"/>
-              <a:t>2017/7/10</a:t>
+              <a:t>2017/8/17</a:t>
             </a:fld>
             <a:endParaRPr lang="zh-CN" altLang="en-US"/>
           </a:p>
@@ -11872,7 +11872,7 @@
           <a:p>
             <a:fld id="{7A78726F-0AD2-4A20-BC72-263D2D3F3A2F}" type="datetime1">
               <a:rPr lang="en-US" altLang="zh-CN" smtClean="0"/>
-              <a:t>7/10/2017</a:t>
+              <a:t>8/17/2017</a:t>
             </a:fld>
             <a:endParaRPr lang="en-US"/>
           </a:p>
@@ -14412,28 +14412,7 @@
                 <a:latin typeface="微软雅黑" panose="020B0503020204020204" pitchFamily="34" charset="-122"/>
                 <a:ea typeface="微软雅黑" panose="020B0503020204020204" pitchFamily="34" charset="-122"/>
               </a:rPr>
-              <a:t>互换</a:t>
-            </a:r>
-            <a:r>
-              <a:rPr lang="zh-CN" altLang="en-US" dirty="0" smtClean="0">
-                <a:latin typeface="微软雅黑" panose="020B0503020204020204" pitchFamily="34" charset="-122"/>
-                <a:ea typeface="微软雅黑" panose="020B0503020204020204" pitchFamily="34" charset="-122"/>
-              </a:rPr>
-              <a:t>，</a:t>
-            </a:r>
-            <a:r>
-              <a:rPr lang="zh-CN" altLang="en-US" dirty="0" smtClean="0">
-                <a:latin typeface="微软雅黑" panose="020B0503020204020204" pitchFamily="34" charset="-122"/>
-                <a:ea typeface="微软雅黑" panose="020B0503020204020204" pitchFamily="34" charset="-122"/>
-              </a:rPr>
-              <a:t>返回格式化后的结果即可实现原样返回消息</a:t>
-            </a:r>
-            <a:r>
-              <a:rPr lang="zh-CN" altLang="en-US" dirty="0" smtClean="0">
-                <a:latin typeface="微软雅黑" panose="020B0503020204020204" pitchFamily="34" charset="-122"/>
-                <a:ea typeface="微软雅黑" panose="020B0503020204020204" pitchFamily="34" charset="-122"/>
-              </a:rPr>
-              <a:t>。</a:t>
+              <a:t>互换，返回格式化后的结果即可实现原样返回消息。</a:t>
             </a:r>
             <a:endParaRPr lang="en-US" altLang="zh-CN" dirty="0" smtClean="0">
               <a:latin typeface="微软雅黑" panose="020B0503020204020204" pitchFamily="34" charset="-122"/>
@@ -18844,7 +18823,7 @@
         <p:spPr>
           <a:xfrm>
             <a:off x="1054100" y="1785937"/>
-            <a:ext cx="10047288" cy="2677656"/>
+            <a:ext cx="10047288" cy="3600986"/>
           </a:xfrm>
           <a:prstGeom prst="rect">
             <a:avLst/>
@@ -19028,7 +19007,131 @@
                 <a:latin typeface="微软雅黑" panose="020B0503020204020204" pitchFamily="34" charset="-122"/>
                 <a:ea typeface="微软雅黑" panose="020B0503020204020204" pitchFamily="34" charset="-122"/>
               </a:rPr>
-              <a:t>标签的名称就会被解析为对象的属性。</a:t>
+              <a:t>标签的名称就会被解析为对象的属性</a:t>
+            </a:r>
+            <a:r>
+              <a:rPr lang="zh-CN" altLang="en-US" sz="2000" dirty="0" smtClean="0">
+                <a:latin typeface="微软雅黑" panose="020B0503020204020204" pitchFamily="34" charset="-122"/>
+                <a:ea typeface="微软雅黑" panose="020B0503020204020204" pitchFamily="34" charset="-122"/>
+              </a:rPr>
+              <a:t>。</a:t>
+            </a:r>
+            <a:endParaRPr lang="en-US" altLang="zh-CN" sz="2000" dirty="0" smtClean="0">
+              <a:latin typeface="微软雅黑" panose="020B0503020204020204" pitchFamily="34" charset="-122"/>
+              <a:ea typeface="微软雅黑" panose="020B0503020204020204" pitchFamily="34" charset="-122"/>
+            </a:endParaRPr>
+          </a:p>
+          <a:p>
+            <a:pPr marL="285750" indent="-285750">
+              <a:lnSpc>
+                <a:spcPct val="150000"/>
+              </a:lnSpc>
+              <a:buFont typeface="Arial" panose="020B0604020202020204" pitchFamily="34" charset="0"/>
+              <a:buChar char="•"/>
+            </a:pPr>
+            <a:r>
+              <a:rPr lang="zh-CN" altLang="en-US" sz="2000" dirty="0" smtClean="0">
+                <a:latin typeface="微软雅黑" panose="020B0503020204020204" pitchFamily="34" charset="-122"/>
+                <a:ea typeface="微软雅黑" panose="020B0503020204020204" pitchFamily="34" charset="-122"/>
+              </a:rPr>
+              <a:t>使用</a:t>
+            </a:r>
+            <a:r>
+              <a:rPr lang="en-US" altLang="zh-CN" sz="2000" dirty="0" err="1" smtClean="0">
+                <a:latin typeface="微软雅黑" panose="020B0503020204020204" pitchFamily="34" charset="-122"/>
+                <a:ea typeface="微软雅黑" panose="020B0503020204020204" pitchFamily="34" charset="-122"/>
+              </a:rPr>
+              <a:t>get_object_vars</a:t>
+            </a:r>
+            <a:r>
+              <a:rPr lang="zh-CN" altLang="en-US" sz="2000" dirty="0" smtClean="0">
+                <a:latin typeface="微软雅黑" panose="020B0503020204020204" pitchFamily="34" charset="-122"/>
+                <a:ea typeface="微软雅黑" panose="020B0503020204020204" pitchFamily="34" charset="-122"/>
+              </a:rPr>
+              <a:t>函数可以把</a:t>
+            </a:r>
+            <a:r>
+              <a:rPr lang="en-US" altLang="zh-CN" sz="2000" dirty="0" smtClean="0">
+                <a:latin typeface="微软雅黑" panose="020B0503020204020204" pitchFamily="34" charset="-122"/>
+                <a:ea typeface="微软雅黑" panose="020B0503020204020204" pitchFamily="34" charset="-122"/>
+              </a:rPr>
+              <a:t>PHP</a:t>
+            </a:r>
+            <a:r>
+              <a:rPr lang="zh-CN" altLang="en-US" sz="2000" dirty="0" smtClean="0">
+                <a:latin typeface="微软雅黑" panose="020B0503020204020204" pitchFamily="34" charset="-122"/>
+                <a:ea typeface="微软雅黑" panose="020B0503020204020204" pitchFamily="34" charset="-122"/>
+              </a:rPr>
+              <a:t>对象转换成数组。</a:t>
+            </a:r>
+            <a:endParaRPr lang="en-US" altLang="zh-CN" sz="2000" dirty="0" smtClean="0">
+              <a:latin typeface="微软雅黑" panose="020B0503020204020204" pitchFamily="34" charset="-122"/>
+              <a:ea typeface="微软雅黑" panose="020B0503020204020204" pitchFamily="34" charset="-122"/>
+            </a:endParaRPr>
+          </a:p>
+          <a:p>
+            <a:pPr marL="285750" indent="-285750">
+              <a:lnSpc>
+                <a:spcPct val="150000"/>
+              </a:lnSpc>
+              <a:buFont typeface="Arial" panose="020B0604020202020204" pitchFamily="34" charset="0"/>
+              <a:buChar char="•"/>
+            </a:pPr>
+            <a:r>
+              <a:rPr lang="en-US" altLang="zh-CN" sz="2000" dirty="0" err="1" smtClean="0">
+                <a:latin typeface="微软雅黑" panose="020B0503020204020204" pitchFamily="34" charset="-122"/>
+                <a:ea typeface="微软雅黑" panose="020B0503020204020204" pitchFamily="34" charset="-122"/>
+              </a:rPr>
+              <a:t>DOMDocument</a:t>
+            </a:r>
+            <a:r>
+              <a:rPr lang="zh-CN" altLang="en-US" sz="2000" dirty="0" smtClean="0">
+                <a:latin typeface="微软雅黑" panose="020B0503020204020204" pitchFamily="34" charset="-122"/>
+                <a:ea typeface="微软雅黑" panose="020B0503020204020204" pitchFamily="34" charset="-122"/>
+              </a:rPr>
+              <a:t>类</a:t>
+            </a:r>
+            <a:r>
+              <a:rPr lang="zh-CN" altLang="en-US" sz="2000" dirty="0">
+                <a:latin typeface="微软雅黑" panose="020B0503020204020204" pitchFamily="34" charset="-122"/>
+                <a:ea typeface="微软雅黑" panose="020B0503020204020204" pitchFamily="34" charset="-122"/>
+              </a:rPr>
+              <a:t>可以</a:t>
+            </a:r>
+            <a:r>
+              <a:rPr lang="zh-CN" altLang="en-US" sz="2000" dirty="0" smtClean="0">
+                <a:latin typeface="微软雅黑" panose="020B0503020204020204" pitchFamily="34" charset="-122"/>
+                <a:ea typeface="微软雅黑" panose="020B0503020204020204" pitchFamily="34" charset="-122"/>
+              </a:rPr>
+              <a:t>加载</a:t>
+            </a:r>
+            <a:r>
+              <a:rPr lang="en-US" altLang="zh-CN" sz="2000" dirty="0" smtClean="0">
+                <a:latin typeface="微软雅黑" panose="020B0503020204020204" pitchFamily="34" charset="-122"/>
+                <a:ea typeface="微软雅黑" panose="020B0503020204020204" pitchFamily="34" charset="-122"/>
+              </a:rPr>
+              <a:t>XML</a:t>
+            </a:r>
+            <a:r>
+              <a:rPr lang="zh-CN" altLang="en-US" sz="2000" dirty="0" smtClean="0">
+                <a:latin typeface="微软雅黑" panose="020B0503020204020204" pitchFamily="34" charset="-122"/>
+                <a:ea typeface="微软雅黑" panose="020B0503020204020204" pitchFamily="34" charset="-122"/>
+              </a:rPr>
+              <a:t>数据为</a:t>
+            </a:r>
+            <a:r>
+              <a:rPr lang="en-US" altLang="zh-CN" sz="2000" dirty="0" smtClean="0">
+                <a:latin typeface="微软雅黑" panose="020B0503020204020204" pitchFamily="34" charset="-122"/>
+                <a:ea typeface="微软雅黑" panose="020B0503020204020204" pitchFamily="34" charset="-122"/>
+              </a:rPr>
+              <a:t>DOM</a:t>
+            </a:r>
+            <a:r>
+              <a:rPr lang="zh-CN" altLang="en-US" sz="2000" dirty="0" smtClean="0">
+                <a:latin typeface="微软雅黑" panose="020B0503020204020204" pitchFamily="34" charset="-122"/>
+                <a:ea typeface="微软雅黑" panose="020B0503020204020204" pitchFamily="34" charset="-122"/>
+              </a:rPr>
+              <a:t>，之后使用方法操标签数据。</a:t>
             </a:r>
             <a:endParaRPr lang="en-US" altLang="zh-CN" sz="2000" dirty="0" smtClean="0">
               <a:latin typeface="微软雅黑" panose="020B0503020204020204" pitchFamily="34" charset="-122"/>

</xml_diff>